<commit_message>
Update architecture diagram with new option.
</commit_message>
<xml_diff>
--- a/docs/images/snyk-security-architecture-diagram.pptx
+++ b/docs/images/snyk-security-architecture-diagram.pptx
@@ -104,6 +104,22 @@
       </a:defRPr>
     </a:lvl9pPr>
   </p:defaultTextStyle>
+  <p:extLst>
+    <p:ext uri="{EFAFB233-063F-42B5-8137-9DF3F51BA10A}">
+      <p15:sldGuideLst xmlns:p15="http://schemas.microsoft.com/office/powerpoint/2012/main">
+        <p15:guide id="1" orient="horz" pos="2160" userDrawn="1">
+          <p15:clr>
+            <a:srgbClr val="A4A3A4"/>
+          </p15:clr>
+        </p15:guide>
+        <p15:guide id="2" pos="3840" userDrawn="1">
+          <p15:clr>
+            <a:srgbClr val="A4A3A4"/>
+          </p15:clr>
+        </p15:guide>
+      </p15:sldGuideLst>
+    </p:ext>
+  </p:extLst>
 </p:presentation>
 </file>
 
@@ -149,10 +165,9 @@
           </a:lstStyle>
           <a:p>
             <a:r>
-              <a:rPr lang="en-US" smtClean="0"/>
+              <a:rPr lang="en-US"/>
               <a:t>Click to edit Master title style</a:t>
             </a:r>
-            <a:endParaRPr lang="en-US"/>
           </a:p>
         </p:txBody>
       </p:sp>
@@ -214,10 +229,9 @@
           </a:lstStyle>
           <a:p>
             <a:r>
-              <a:rPr lang="en-US" smtClean="0"/>
+              <a:rPr lang="en-US"/>
               <a:t>Click to edit Master subtitle style</a:t>
             </a:r>
-            <a:endParaRPr lang="en-US"/>
           </a:p>
         </p:txBody>
       </p:sp>
@@ -238,7 +252,7 @@
           <a:p>
             <a:fld id="{629678B4-AFFA-4E2A-B0AC-005E4083559E}" type="datetimeFigureOut">
               <a:rPr lang="en-US" smtClean="0"/>
-              <a:t>12/17/2020</a:t>
+              <a:t>12/9/21</a:t>
             </a:fld>
             <a:endParaRPr lang="en-US"/>
           </a:p>
@@ -332,10 +346,9 @@
           <a:lstStyle/>
           <a:p>
             <a:r>
-              <a:rPr lang="en-US" smtClean="0"/>
+              <a:rPr lang="en-US"/>
               <a:t>Click to edit Master title style</a:t>
             </a:r>
-            <a:endParaRPr lang="en-US"/>
           </a:p>
         </p:txBody>
       </p:sp>
@@ -356,38 +369,37 @@
           <a:p>
             <a:pPr lvl="0"/>
             <a:r>
-              <a:rPr lang="en-US" smtClean="0"/>
+              <a:rPr lang="en-US"/>
               <a:t>Edit Master text styles</a:t>
             </a:r>
           </a:p>
           <a:p>
             <a:pPr lvl="1"/>
             <a:r>
-              <a:rPr lang="en-US" smtClean="0"/>
+              <a:rPr lang="en-US"/>
               <a:t>Second level</a:t>
             </a:r>
           </a:p>
           <a:p>
             <a:pPr lvl="2"/>
             <a:r>
-              <a:rPr lang="en-US" smtClean="0"/>
+              <a:rPr lang="en-US"/>
               <a:t>Third level</a:t>
             </a:r>
           </a:p>
           <a:p>
             <a:pPr lvl="3"/>
             <a:r>
-              <a:rPr lang="en-US" smtClean="0"/>
+              <a:rPr lang="en-US"/>
               <a:t>Fourth level</a:t>
             </a:r>
           </a:p>
           <a:p>
             <a:pPr lvl="4"/>
             <a:r>
-              <a:rPr lang="en-US" smtClean="0"/>
+              <a:rPr lang="en-US"/>
               <a:t>Fifth level</a:t>
             </a:r>
-            <a:endParaRPr lang="en-US"/>
           </a:p>
         </p:txBody>
       </p:sp>
@@ -408,7 +420,7 @@
           <a:p>
             <a:fld id="{629678B4-AFFA-4E2A-B0AC-005E4083559E}" type="datetimeFigureOut">
               <a:rPr lang="en-US" smtClean="0"/>
-              <a:t>12/17/2020</a:t>
+              <a:t>12/9/21</a:t>
             </a:fld>
             <a:endParaRPr lang="en-US"/>
           </a:p>
@@ -507,10 +519,9 @@
           <a:lstStyle/>
           <a:p>
             <a:r>
-              <a:rPr lang="en-US" smtClean="0"/>
+              <a:rPr lang="en-US"/>
               <a:t>Click to edit Master title style</a:t>
             </a:r>
-            <a:endParaRPr lang="en-US"/>
           </a:p>
         </p:txBody>
       </p:sp>
@@ -536,38 +547,37 @@
           <a:p>
             <a:pPr lvl="0"/>
             <a:r>
-              <a:rPr lang="en-US" smtClean="0"/>
+              <a:rPr lang="en-US"/>
               <a:t>Edit Master text styles</a:t>
             </a:r>
           </a:p>
           <a:p>
             <a:pPr lvl="1"/>
             <a:r>
-              <a:rPr lang="en-US" smtClean="0"/>
+              <a:rPr lang="en-US"/>
               <a:t>Second level</a:t>
             </a:r>
           </a:p>
           <a:p>
             <a:pPr lvl="2"/>
             <a:r>
-              <a:rPr lang="en-US" smtClean="0"/>
+              <a:rPr lang="en-US"/>
               <a:t>Third level</a:t>
             </a:r>
           </a:p>
           <a:p>
             <a:pPr lvl="3"/>
             <a:r>
-              <a:rPr lang="en-US" smtClean="0"/>
+              <a:rPr lang="en-US"/>
               <a:t>Fourth level</a:t>
             </a:r>
           </a:p>
           <a:p>
             <a:pPr lvl="4"/>
             <a:r>
-              <a:rPr lang="en-US" smtClean="0"/>
+              <a:rPr lang="en-US"/>
               <a:t>Fifth level</a:t>
             </a:r>
-            <a:endParaRPr lang="en-US"/>
           </a:p>
         </p:txBody>
       </p:sp>
@@ -588,7 +598,7 @@
           <a:p>
             <a:fld id="{629678B4-AFFA-4E2A-B0AC-005E4083559E}" type="datetimeFigureOut">
               <a:rPr lang="en-US" smtClean="0"/>
-              <a:t>12/17/2020</a:t>
+              <a:t>12/9/21</a:t>
             </a:fld>
             <a:endParaRPr lang="en-US"/>
           </a:p>
@@ -682,10 +692,9 @@
           <a:lstStyle/>
           <a:p>
             <a:r>
-              <a:rPr lang="en-US" smtClean="0"/>
+              <a:rPr lang="en-US"/>
               <a:t>Click to edit Master title style</a:t>
             </a:r>
-            <a:endParaRPr lang="en-US"/>
           </a:p>
         </p:txBody>
       </p:sp>
@@ -706,38 +715,37 @@
           <a:p>
             <a:pPr lvl="0"/>
             <a:r>
-              <a:rPr lang="en-US" smtClean="0"/>
+              <a:rPr lang="en-US"/>
               <a:t>Edit Master text styles</a:t>
             </a:r>
           </a:p>
           <a:p>
             <a:pPr lvl="1"/>
             <a:r>
-              <a:rPr lang="en-US" smtClean="0"/>
+              <a:rPr lang="en-US"/>
               <a:t>Second level</a:t>
             </a:r>
           </a:p>
           <a:p>
             <a:pPr lvl="2"/>
             <a:r>
-              <a:rPr lang="en-US" smtClean="0"/>
+              <a:rPr lang="en-US"/>
               <a:t>Third level</a:t>
             </a:r>
           </a:p>
           <a:p>
             <a:pPr lvl="3"/>
             <a:r>
-              <a:rPr lang="en-US" smtClean="0"/>
+              <a:rPr lang="en-US"/>
               <a:t>Fourth level</a:t>
             </a:r>
           </a:p>
           <a:p>
             <a:pPr lvl="4"/>
             <a:r>
-              <a:rPr lang="en-US" smtClean="0"/>
+              <a:rPr lang="en-US"/>
               <a:t>Fifth level</a:t>
             </a:r>
-            <a:endParaRPr lang="en-US"/>
           </a:p>
         </p:txBody>
       </p:sp>
@@ -758,7 +766,7 @@
           <a:p>
             <a:fld id="{629678B4-AFFA-4E2A-B0AC-005E4083559E}" type="datetimeFigureOut">
               <a:rPr lang="en-US" smtClean="0"/>
-              <a:t>12/17/2020</a:t>
+              <a:t>12/9/21</a:t>
             </a:fld>
             <a:endParaRPr lang="en-US"/>
           </a:p>
@@ -861,10 +869,9 @@
           </a:lstStyle>
           <a:p>
             <a:r>
-              <a:rPr lang="en-US" smtClean="0"/>
+              <a:rPr lang="en-US"/>
               <a:t>Click to edit Master title style</a:t>
             </a:r>
-            <a:endParaRPr lang="en-US"/>
           </a:p>
         </p:txBody>
       </p:sp>
@@ -981,7 +988,7 @@
           <a:p>
             <a:pPr lvl="0"/>
             <a:r>
-              <a:rPr lang="en-US" smtClean="0"/>
+              <a:rPr lang="en-US"/>
               <a:t>Edit Master text styles</a:t>
             </a:r>
           </a:p>
@@ -1004,7 +1011,7 @@
           <a:p>
             <a:fld id="{629678B4-AFFA-4E2A-B0AC-005E4083559E}" type="datetimeFigureOut">
               <a:rPr lang="en-US" smtClean="0"/>
-              <a:t>12/17/2020</a:t>
+              <a:t>12/9/21</a:t>
             </a:fld>
             <a:endParaRPr lang="en-US"/>
           </a:p>
@@ -1098,10 +1105,9 @@
           <a:lstStyle/>
           <a:p>
             <a:r>
-              <a:rPr lang="en-US" smtClean="0"/>
+              <a:rPr lang="en-US"/>
               <a:t>Click to edit Master title style</a:t>
             </a:r>
-            <a:endParaRPr lang="en-US"/>
           </a:p>
         </p:txBody>
       </p:sp>
@@ -1127,38 +1133,37 @@
           <a:p>
             <a:pPr lvl="0"/>
             <a:r>
-              <a:rPr lang="en-US" smtClean="0"/>
+              <a:rPr lang="en-US"/>
               <a:t>Edit Master text styles</a:t>
             </a:r>
           </a:p>
           <a:p>
             <a:pPr lvl="1"/>
             <a:r>
-              <a:rPr lang="en-US" smtClean="0"/>
+              <a:rPr lang="en-US"/>
               <a:t>Second level</a:t>
             </a:r>
           </a:p>
           <a:p>
             <a:pPr lvl="2"/>
             <a:r>
-              <a:rPr lang="en-US" smtClean="0"/>
+              <a:rPr lang="en-US"/>
               <a:t>Third level</a:t>
             </a:r>
           </a:p>
           <a:p>
             <a:pPr lvl="3"/>
             <a:r>
-              <a:rPr lang="en-US" smtClean="0"/>
+              <a:rPr lang="en-US"/>
               <a:t>Fourth level</a:t>
             </a:r>
           </a:p>
           <a:p>
             <a:pPr lvl="4"/>
             <a:r>
-              <a:rPr lang="en-US" smtClean="0"/>
+              <a:rPr lang="en-US"/>
               <a:t>Fifth level</a:t>
             </a:r>
-            <a:endParaRPr lang="en-US"/>
           </a:p>
         </p:txBody>
       </p:sp>
@@ -1184,38 +1189,37 @@
           <a:p>
             <a:pPr lvl="0"/>
             <a:r>
-              <a:rPr lang="en-US" smtClean="0"/>
+              <a:rPr lang="en-US"/>
               <a:t>Edit Master text styles</a:t>
             </a:r>
           </a:p>
           <a:p>
             <a:pPr lvl="1"/>
             <a:r>
-              <a:rPr lang="en-US" smtClean="0"/>
+              <a:rPr lang="en-US"/>
               <a:t>Second level</a:t>
             </a:r>
           </a:p>
           <a:p>
             <a:pPr lvl="2"/>
             <a:r>
-              <a:rPr lang="en-US" smtClean="0"/>
+              <a:rPr lang="en-US"/>
               <a:t>Third level</a:t>
             </a:r>
           </a:p>
           <a:p>
             <a:pPr lvl="3"/>
             <a:r>
-              <a:rPr lang="en-US" smtClean="0"/>
+              <a:rPr lang="en-US"/>
               <a:t>Fourth level</a:t>
             </a:r>
           </a:p>
           <a:p>
             <a:pPr lvl="4"/>
             <a:r>
-              <a:rPr lang="en-US" smtClean="0"/>
+              <a:rPr lang="en-US"/>
               <a:t>Fifth level</a:t>
             </a:r>
-            <a:endParaRPr lang="en-US"/>
           </a:p>
         </p:txBody>
       </p:sp>
@@ -1236,7 +1240,7 @@
           <a:p>
             <a:fld id="{629678B4-AFFA-4E2A-B0AC-005E4083559E}" type="datetimeFigureOut">
               <a:rPr lang="en-US" smtClean="0"/>
-              <a:t>12/17/2020</a:t>
+              <a:t>12/9/21</a:t>
             </a:fld>
             <a:endParaRPr lang="en-US"/>
           </a:p>
@@ -1335,10 +1339,9 @@
           <a:lstStyle/>
           <a:p>
             <a:r>
-              <a:rPr lang="en-US" smtClean="0"/>
+              <a:rPr lang="en-US"/>
               <a:t>Click to edit Master title style</a:t>
             </a:r>
-            <a:endParaRPr lang="en-US"/>
           </a:p>
         </p:txBody>
       </p:sp>
@@ -1401,7 +1404,7 @@
           <a:p>
             <a:pPr lvl="0"/>
             <a:r>
-              <a:rPr lang="en-US" smtClean="0"/>
+              <a:rPr lang="en-US"/>
               <a:t>Edit Master text styles</a:t>
             </a:r>
           </a:p>
@@ -1429,38 +1432,37 @@
           <a:p>
             <a:pPr lvl="0"/>
             <a:r>
-              <a:rPr lang="en-US" smtClean="0"/>
+              <a:rPr lang="en-US"/>
               <a:t>Edit Master text styles</a:t>
             </a:r>
           </a:p>
           <a:p>
             <a:pPr lvl="1"/>
             <a:r>
-              <a:rPr lang="en-US" smtClean="0"/>
+              <a:rPr lang="en-US"/>
               <a:t>Second level</a:t>
             </a:r>
           </a:p>
           <a:p>
             <a:pPr lvl="2"/>
             <a:r>
-              <a:rPr lang="en-US" smtClean="0"/>
+              <a:rPr lang="en-US"/>
               <a:t>Third level</a:t>
             </a:r>
           </a:p>
           <a:p>
             <a:pPr lvl="3"/>
             <a:r>
-              <a:rPr lang="en-US" smtClean="0"/>
+              <a:rPr lang="en-US"/>
               <a:t>Fourth level</a:t>
             </a:r>
           </a:p>
           <a:p>
             <a:pPr lvl="4"/>
             <a:r>
-              <a:rPr lang="en-US" smtClean="0"/>
+              <a:rPr lang="en-US"/>
               <a:t>Fifth level</a:t>
             </a:r>
-            <a:endParaRPr lang="en-US"/>
           </a:p>
         </p:txBody>
       </p:sp>
@@ -1523,7 +1525,7 @@
           <a:p>
             <a:pPr lvl="0"/>
             <a:r>
-              <a:rPr lang="en-US" smtClean="0"/>
+              <a:rPr lang="en-US"/>
               <a:t>Edit Master text styles</a:t>
             </a:r>
           </a:p>
@@ -1551,38 +1553,37 @@
           <a:p>
             <a:pPr lvl="0"/>
             <a:r>
-              <a:rPr lang="en-US" smtClean="0"/>
+              <a:rPr lang="en-US"/>
               <a:t>Edit Master text styles</a:t>
             </a:r>
           </a:p>
           <a:p>
             <a:pPr lvl="1"/>
             <a:r>
-              <a:rPr lang="en-US" smtClean="0"/>
+              <a:rPr lang="en-US"/>
               <a:t>Second level</a:t>
             </a:r>
           </a:p>
           <a:p>
             <a:pPr lvl="2"/>
             <a:r>
-              <a:rPr lang="en-US" smtClean="0"/>
+              <a:rPr lang="en-US"/>
               <a:t>Third level</a:t>
             </a:r>
           </a:p>
           <a:p>
             <a:pPr lvl="3"/>
             <a:r>
-              <a:rPr lang="en-US" smtClean="0"/>
+              <a:rPr lang="en-US"/>
               <a:t>Fourth level</a:t>
             </a:r>
           </a:p>
           <a:p>
             <a:pPr lvl="4"/>
             <a:r>
-              <a:rPr lang="en-US" smtClean="0"/>
+              <a:rPr lang="en-US"/>
               <a:t>Fifth level</a:t>
             </a:r>
-            <a:endParaRPr lang="en-US"/>
           </a:p>
         </p:txBody>
       </p:sp>
@@ -1603,7 +1604,7 @@
           <a:p>
             <a:fld id="{629678B4-AFFA-4E2A-B0AC-005E4083559E}" type="datetimeFigureOut">
               <a:rPr lang="en-US" smtClean="0"/>
-              <a:t>12/17/2020</a:t>
+              <a:t>12/9/21</a:t>
             </a:fld>
             <a:endParaRPr lang="en-US"/>
           </a:p>
@@ -1697,10 +1698,9 @@
           <a:lstStyle/>
           <a:p>
             <a:r>
-              <a:rPr lang="en-US" smtClean="0"/>
+              <a:rPr lang="en-US"/>
               <a:t>Click to edit Master title style</a:t>
             </a:r>
-            <a:endParaRPr lang="en-US"/>
           </a:p>
         </p:txBody>
       </p:sp>
@@ -1721,7 +1721,7 @@
           <a:p>
             <a:fld id="{629678B4-AFFA-4E2A-B0AC-005E4083559E}" type="datetimeFigureOut">
               <a:rPr lang="en-US" smtClean="0"/>
-              <a:t>12/17/2020</a:t>
+              <a:t>12/9/21</a:t>
             </a:fld>
             <a:endParaRPr lang="en-US"/>
           </a:p>
@@ -1816,7 +1816,7 @@
           <a:p>
             <a:fld id="{629678B4-AFFA-4E2A-B0AC-005E4083559E}" type="datetimeFigureOut">
               <a:rPr lang="en-US" smtClean="0"/>
-              <a:t>12/17/2020</a:t>
+              <a:t>12/9/21</a:t>
             </a:fld>
             <a:endParaRPr lang="en-US"/>
           </a:p>
@@ -1919,10 +1919,9 @@
           </a:lstStyle>
           <a:p>
             <a:r>
-              <a:rPr lang="en-US" smtClean="0"/>
+              <a:rPr lang="en-US"/>
               <a:t>Click to edit Master title style</a:t>
             </a:r>
-            <a:endParaRPr lang="en-US"/>
           </a:p>
         </p:txBody>
       </p:sp>
@@ -1976,38 +1975,37 @@
           <a:p>
             <a:pPr lvl="0"/>
             <a:r>
-              <a:rPr lang="en-US" smtClean="0"/>
+              <a:rPr lang="en-US"/>
               <a:t>Edit Master text styles</a:t>
             </a:r>
           </a:p>
           <a:p>
             <a:pPr lvl="1"/>
             <a:r>
-              <a:rPr lang="en-US" smtClean="0"/>
+              <a:rPr lang="en-US"/>
               <a:t>Second level</a:t>
             </a:r>
           </a:p>
           <a:p>
             <a:pPr lvl="2"/>
             <a:r>
-              <a:rPr lang="en-US" smtClean="0"/>
+              <a:rPr lang="en-US"/>
               <a:t>Third level</a:t>
             </a:r>
           </a:p>
           <a:p>
             <a:pPr lvl="3"/>
             <a:r>
-              <a:rPr lang="en-US" smtClean="0"/>
+              <a:rPr lang="en-US"/>
               <a:t>Fourth level</a:t>
             </a:r>
           </a:p>
           <a:p>
             <a:pPr lvl="4"/>
             <a:r>
-              <a:rPr lang="en-US" smtClean="0"/>
+              <a:rPr lang="en-US"/>
               <a:t>Fifth level</a:t>
             </a:r>
-            <a:endParaRPr lang="en-US"/>
           </a:p>
         </p:txBody>
       </p:sp>
@@ -2070,7 +2068,7 @@
           <a:p>
             <a:pPr lvl="0"/>
             <a:r>
-              <a:rPr lang="en-US" smtClean="0"/>
+              <a:rPr lang="en-US"/>
               <a:t>Edit Master text styles</a:t>
             </a:r>
           </a:p>
@@ -2093,7 +2091,7 @@
           <a:p>
             <a:fld id="{629678B4-AFFA-4E2A-B0AC-005E4083559E}" type="datetimeFigureOut">
               <a:rPr lang="en-US" smtClean="0"/>
-              <a:t>12/17/2020</a:t>
+              <a:t>12/9/21</a:t>
             </a:fld>
             <a:endParaRPr lang="en-US"/>
           </a:p>
@@ -2196,10 +2194,9 @@
           </a:lstStyle>
           <a:p>
             <a:r>
-              <a:rPr lang="en-US" smtClean="0"/>
+              <a:rPr lang="en-US"/>
               <a:t>Click to edit Master title style</a:t>
             </a:r>
-            <a:endParaRPr lang="en-US"/>
           </a:p>
         </p:txBody>
       </p:sp>
@@ -2323,7 +2320,7 @@
           <a:p>
             <a:pPr lvl="0"/>
             <a:r>
-              <a:rPr lang="en-US" smtClean="0"/>
+              <a:rPr lang="en-US"/>
               <a:t>Edit Master text styles</a:t>
             </a:r>
           </a:p>
@@ -2346,7 +2343,7 @@
           <a:p>
             <a:fld id="{629678B4-AFFA-4E2A-B0AC-005E4083559E}" type="datetimeFigureOut">
               <a:rPr lang="en-US" smtClean="0"/>
-              <a:t>12/17/2020</a:t>
+              <a:t>12/9/21</a:t>
             </a:fld>
             <a:endParaRPr lang="en-US"/>
           </a:p>
@@ -2455,10 +2452,9 @@
           <a:lstStyle/>
           <a:p>
             <a:r>
-              <a:rPr lang="en-US" smtClean="0"/>
+              <a:rPr lang="en-US"/>
               <a:t>Click to edit Master title style</a:t>
             </a:r>
-            <a:endParaRPr lang="en-US"/>
           </a:p>
         </p:txBody>
       </p:sp>
@@ -2489,38 +2485,37 @@
           <a:p>
             <a:pPr lvl="0"/>
             <a:r>
-              <a:rPr lang="en-US" smtClean="0"/>
+              <a:rPr lang="en-US"/>
               <a:t>Edit Master text styles</a:t>
             </a:r>
           </a:p>
           <a:p>
             <a:pPr lvl="1"/>
             <a:r>
-              <a:rPr lang="en-US" smtClean="0"/>
+              <a:rPr lang="en-US"/>
               <a:t>Second level</a:t>
             </a:r>
           </a:p>
           <a:p>
             <a:pPr lvl="2"/>
             <a:r>
-              <a:rPr lang="en-US" smtClean="0"/>
+              <a:rPr lang="en-US"/>
               <a:t>Third level</a:t>
             </a:r>
           </a:p>
           <a:p>
             <a:pPr lvl="3"/>
             <a:r>
-              <a:rPr lang="en-US" smtClean="0"/>
+              <a:rPr lang="en-US"/>
               <a:t>Fourth level</a:t>
             </a:r>
           </a:p>
           <a:p>
             <a:pPr lvl="4"/>
             <a:r>
-              <a:rPr lang="en-US" smtClean="0"/>
+              <a:rPr lang="en-US"/>
               <a:t>Fifth level</a:t>
             </a:r>
-            <a:endParaRPr lang="en-US"/>
           </a:p>
         </p:txBody>
       </p:sp>
@@ -2559,7 +2554,7 @@
           <a:p>
             <a:fld id="{629678B4-AFFA-4E2A-B0AC-005E4083559E}" type="datetimeFigureOut">
               <a:rPr lang="en-US" smtClean="0"/>
-              <a:t>12/17/2020</a:t>
+              <a:t>12/9/21</a:t>
             </a:fld>
             <a:endParaRPr lang="en-US"/>
           </a:p>
@@ -2978,8 +2973,8 @@
         </p:nvSpPr>
         <p:spPr>
           <a:xfrm flipH="1" flipV="1">
-            <a:off x="2942874" y="2809597"/>
-            <a:ext cx="2311104" cy="2572157"/>
+            <a:off x="1625541" y="2809595"/>
+            <a:ext cx="3508209" cy="2572156"/>
           </a:xfrm>
           <a:custGeom>
             <a:avLst/>
@@ -3082,7 +3077,7 @@
         </p:nvSpPr>
         <p:spPr>
           <a:xfrm>
-            <a:off x="3661074" y="3248156"/>
+            <a:off x="2342775" y="3248156"/>
             <a:ext cx="629827" cy="1026884"/>
           </a:xfrm>
           <a:prstGeom prst="rect">
@@ -3134,7 +3129,7 @@
         </p:nvSpPr>
         <p:spPr>
           <a:xfrm>
-            <a:off x="1783604" y="640939"/>
+            <a:off x="488571" y="640939"/>
             <a:ext cx="2496370" cy="2168975"/>
           </a:xfrm>
           <a:prstGeom prst="rect">
@@ -3210,7 +3205,7 @@
         </p:nvSpPr>
         <p:spPr>
           <a:xfrm>
-            <a:off x="1296031" y="2101829"/>
+            <a:off x="0" y="2117182"/>
             <a:ext cx="2301904" cy="276999"/>
           </a:xfrm>
           <a:prstGeom prst="rect">
@@ -3251,7 +3246,7 @@
         </p:nvSpPr>
         <p:spPr>
           <a:xfrm>
-            <a:off x="2062886" y="3740716"/>
+            <a:off x="744587" y="3740716"/>
             <a:ext cx="1730846" cy="523220"/>
           </a:xfrm>
           <a:prstGeom prst="rect">
@@ -3315,7 +3310,7 @@
           <a:blip r:embed="rId2">
             <a:extLst>
               <a:ext uri="{96DAC541-7B7A-43D3-8B79-37D633B846F1}">
-                <asvg:svgBlip xmlns:asvg="http://schemas.microsoft.com/office/drawing/2016/SVG/main" xmlns="" r:embed="rId3"/>
+                <asvg:svgBlip xmlns:asvg="http://schemas.microsoft.com/office/drawing/2016/SVG/main" r:embed="rId3"/>
               </a:ext>
             </a:extLst>
           </a:blip>
@@ -3325,7 +3320,7 @@
         </p:blipFill>
         <p:spPr>
           <a:xfrm>
-            <a:off x="2091383" y="1307987"/>
+            <a:off x="773084" y="1307987"/>
             <a:ext cx="711200" cy="711200"/>
           </a:xfrm>
           <a:prstGeom prst="rect">
@@ -3351,7 +3346,7 @@
           <a:blip r:embed="rId4">
             <a:extLst>
               <a:ext uri="{96DAC541-7B7A-43D3-8B79-37D633B846F1}">
-                <asvg:svgBlip xmlns:asvg="http://schemas.microsoft.com/office/drawing/2016/SVG/main" xmlns="" r:embed="rId5"/>
+                <asvg:svgBlip xmlns:asvg="http://schemas.microsoft.com/office/drawing/2016/SVG/main" r:embed="rId5"/>
               </a:ext>
             </a:extLst>
           </a:blip>
@@ -3361,7 +3356,7 @@
         </p:blipFill>
         <p:spPr>
           <a:xfrm>
-            <a:off x="1783604" y="640937"/>
+            <a:off x="465305" y="640937"/>
             <a:ext cx="330200" cy="330200"/>
           </a:xfrm>
           <a:prstGeom prst="rect">
@@ -3383,7 +3378,7 @@
         </p:nvSpPr>
         <p:spPr>
           <a:xfrm>
-            <a:off x="8042989" y="640937"/>
+            <a:off x="6323236" y="640937"/>
             <a:ext cx="2496312" cy="2168975"/>
           </a:xfrm>
           <a:prstGeom prst="rect">
@@ -3463,7 +3458,7 @@
           <a:blip r:embed="rId4">
             <a:extLst>
               <a:ext uri="{96DAC541-7B7A-43D3-8B79-37D633B846F1}">
-                <asvg:svgBlip xmlns:asvg="http://schemas.microsoft.com/office/drawing/2016/SVG/main" xmlns="" r:embed="rId5"/>
+                <asvg:svgBlip xmlns:asvg="http://schemas.microsoft.com/office/drawing/2016/SVG/main" r:embed="rId5"/>
               </a:ext>
             </a:extLst>
           </a:blip>
@@ -3473,7 +3468,7 @@
         </p:blipFill>
         <p:spPr>
           <a:xfrm>
-            <a:off x="8042989" y="651940"/>
+            <a:off x="6323236" y="651940"/>
             <a:ext cx="330200" cy="330200"/>
           </a:xfrm>
           <a:prstGeom prst="rect">
@@ -3495,7 +3490,7 @@
         </p:nvSpPr>
         <p:spPr>
           <a:xfrm>
-            <a:off x="4923778" y="640938"/>
+            <a:off x="3407343" y="640938"/>
             <a:ext cx="2496312" cy="2168975"/>
           </a:xfrm>
           <a:prstGeom prst="rect">
@@ -3575,7 +3570,7 @@
           <a:blip r:embed="rId4">
             <a:extLst>
               <a:ext uri="{96DAC541-7B7A-43D3-8B79-37D633B846F1}">
-                <asvg:svgBlip xmlns:asvg="http://schemas.microsoft.com/office/drawing/2016/SVG/main" xmlns="" r:embed="rId5"/>
+                <asvg:svgBlip xmlns:asvg="http://schemas.microsoft.com/office/drawing/2016/SVG/main" r:embed="rId5"/>
               </a:ext>
             </a:extLst>
           </a:blip>
@@ -3585,7 +3580,7 @@
         </p:blipFill>
         <p:spPr>
           <a:xfrm>
-            <a:off x="4923778" y="640937"/>
+            <a:off x="3407343" y="640937"/>
             <a:ext cx="330200" cy="330200"/>
           </a:xfrm>
           <a:prstGeom prst="rect">
@@ -3611,7 +3606,7 @@
           <a:blip r:embed="rId6">
             <a:extLst>
               <a:ext uri="{96DAC541-7B7A-43D3-8B79-37D633B846F1}">
-                <asvg:svgBlip xmlns:asvg="http://schemas.microsoft.com/office/drawing/2016/SVG/main" xmlns="" r:embed="rId7"/>
+                <asvg:svgBlip xmlns:asvg="http://schemas.microsoft.com/office/drawing/2016/SVG/main" r:embed="rId7"/>
               </a:ext>
             </a:extLst>
           </a:blip>
@@ -3621,7 +3616,7 @@
         </p:blipFill>
         <p:spPr>
           <a:xfrm>
-            <a:off x="2693424" y="3322563"/>
+            <a:off x="1375125" y="3322563"/>
             <a:ext cx="469900" cy="469900"/>
           </a:xfrm>
           <a:prstGeom prst="rect">
@@ -3646,8 +3641,8 @@
         </p:nvSpPr>
         <p:spPr>
           <a:xfrm flipV="1">
-            <a:off x="7167847" y="2809597"/>
-            <a:ext cx="2255670" cy="2561730"/>
+            <a:off x="7050209" y="2809595"/>
+            <a:ext cx="560630" cy="2107560"/>
           </a:xfrm>
           <a:custGeom>
             <a:avLst/>
@@ -3750,7 +3745,7 @@
         </p:nvSpPr>
         <p:spPr>
           <a:xfrm>
-            <a:off x="9396935" y="3248156"/>
+            <a:off x="7577135" y="3253265"/>
             <a:ext cx="629827" cy="1026884"/>
           </a:xfrm>
           <a:prstGeom prst="rect">
@@ -3802,7 +3797,7 @@
         </p:nvSpPr>
         <p:spPr>
           <a:xfrm>
-            <a:off x="8531512" y="3676615"/>
+            <a:off x="6711712" y="3681724"/>
             <a:ext cx="1730846" cy="523220"/>
           </a:xfrm>
           <a:prstGeom prst="rect">
@@ -3864,7 +3859,7 @@
           <a:blip r:embed="rId6">
             <a:extLst>
               <a:ext uri="{96DAC541-7B7A-43D3-8B79-37D633B846F1}">
-                <asvg:svgBlip xmlns:asvg="http://schemas.microsoft.com/office/drawing/2016/SVG/main" xmlns="" r:embed="rId7"/>
+                <asvg:svgBlip xmlns:asvg="http://schemas.microsoft.com/office/drawing/2016/SVG/main" r:embed="rId7"/>
               </a:ext>
             </a:extLst>
           </a:blip>
@@ -3874,7 +3869,7 @@
         </p:blipFill>
         <p:spPr>
           <a:xfrm>
-            <a:off x="9189035" y="3278822"/>
+            <a:off x="7369235" y="3283931"/>
             <a:ext cx="469900" cy="469900"/>
           </a:xfrm>
           <a:prstGeom prst="rect">
@@ -3882,42 +3877,6 @@
           </a:prstGeom>
         </p:spPr>
       </p:pic>
-      <p:cxnSp>
-        <p:nvCxnSpPr>
-          <p:cNvPr id="23" name="Straight Arrow Connector 22">
-            <a:extLst>
-              <a:ext uri="{FF2B5EF4-FFF2-40B4-BE49-F238E27FC236}">
-                <a16:creationId xmlns:a16="http://schemas.microsoft.com/office/drawing/2014/main" id="{260DDCD4-F9FE-714E-8045-0DE769657656}"/>
-              </a:ext>
-            </a:extLst>
-          </p:cNvPr>
-          <p:cNvCxnSpPr>
-            <a:cxnSpLocks/>
-            <a:stCxn id="27" idx="0"/>
-          </p:cNvCxnSpPr>
-          <p:nvPr/>
-        </p:nvCxnSpPr>
-        <p:spPr>
-          <a:xfrm flipH="1" flipV="1">
-            <a:off x="6188490" y="2809598"/>
-            <a:ext cx="9040" cy="1862410"/>
-          </a:xfrm>
-          <a:prstGeom prst="straightConnector1">
-            <a:avLst/>
-          </a:prstGeom>
-          <a:noFill/>
-          <a:ln w="12700" cap="flat" cmpd="sng" algn="ctr">
-            <a:solidFill>
-              <a:srgbClr val="535B63"/>
-            </a:solidFill>
-            <a:prstDash val="solid"/>
-            <a:miter lim="800000"/>
-            <a:headEnd type="arrow" w="med" len="sm"/>
-            <a:tailEnd type="arrow" w="med" len="sm"/>
-          </a:ln>
-          <a:effectLst/>
-        </p:spPr>
-      </p:cxnSp>
       <p:sp>
         <p:nvSpPr>
           <p:cNvPr id="24" name="Rectangle 23">
@@ -3932,7 +3891,7 @@
         </p:nvSpPr>
         <p:spPr>
           <a:xfrm>
-            <a:off x="6555781" y="3248155"/>
+            <a:off x="5039346" y="3248155"/>
             <a:ext cx="629827" cy="1026885"/>
           </a:xfrm>
           <a:prstGeom prst="rect">
@@ -3972,105 +3931,6 @@
       </p:sp>
       <p:sp>
         <p:nvSpPr>
-          <p:cNvPr id="25" name="TextBox 24">
-            <a:extLst>
-              <a:ext uri="{FF2B5EF4-FFF2-40B4-BE49-F238E27FC236}">
-                <a16:creationId xmlns:a16="http://schemas.microsoft.com/office/drawing/2014/main" id="{192EB717-1DC5-3B41-B68B-93A92F7ECF8F}"/>
-              </a:ext>
-            </a:extLst>
-          </p:cNvPr>
-          <p:cNvSpPr txBox="1"/>
-          <p:nvPr/>
-        </p:nvSpPr>
-        <p:spPr>
-          <a:xfrm>
-            <a:off x="5332107" y="3666211"/>
-            <a:ext cx="1730846" cy="523220"/>
-          </a:xfrm>
-          <a:prstGeom prst="rect">
-            <a:avLst/>
-          </a:prstGeom>
-          <a:solidFill>
-            <a:schemeClr val="bg1"/>
-          </a:solidFill>
-        </p:spPr>
-        <p:txBody>
-          <a:bodyPr wrap="square" rtlCol="0">
-            <a:spAutoFit/>
-          </a:bodyPr>
-          <a:lstStyle/>
-          <a:p>
-            <a:pPr algn="ctr" defTabSz="914400"/>
-            <a:r>
-              <a:rPr lang="en-US" sz="1400" dirty="0">
-                <a:solidFill>
-                  <a:srgbClr val="232F3D"/>
-                </a:solidFill>
-                <a:latin typeface="Arial" panose="020B0604020202020204"/>
-              </a:rPr>
-              <a:t>Cross-account </a:t>
-            </a:r>
-            <a:br>
-              <a:rPr lang="en-US" sz="1400" dirty="0">
-                <a:solidFill>
-                  <a:srgbClr val="232F3D"/>
-                </a:solidFill>
-                <a:latin typeface="Arial" panose="020B0604020202020204"/>
-              </a:rPr>
-            </a:br>
-            <a:r>
-              <a:rPr lang="en-US" sz="1400" dirty="0">
-                <a:solidFill>
-                  <a:srgbClr val="232F3D"/>
-                </a:solidFill>
-                <a:latin typeface="Arial" panose="020B0604020202020204"/>
-              </a:rPr>
-              <a:t>IAM role</a:t>
-            </a:r>
-          </a:p>
-        </p:txBody>
-      </p:sp>
-      <p:pic>
-        <p:nvPicPr>
-          <p:cNvPr id="26" name="Graphic 89">
-            <a:extLst>
-              <a:ext uri="{FF2B5EF4-FFF2-40B4-BE49-F238E27FC236}">
-                <a16:creationId xmlns:a16="http://schemas.microsoft.com/office/drawing/2014/main" id="{8640919C-98B9-7247-A25B-4EC614429D14}"/>
-              </a:ext>
-            </a:extLst>
-          </p:cNvPr>
-          <p:cNvPicPr>
-            <a:picLocks noChangeAspect="1"/>
-          </p:cNvPicPr>
-          <p:nvPr/>
-        </p:nvPicPr>
-        <p:blipFill>
-          <a:blip r:embed="rId6">
-            <a:extLst>
-              <a:ext uri="{96DAC541-7B7A-43D3-8B79-37D633B846F1}">
-                <asvg:svgBlip xmlns:asvg="http://schemas.microsoft.com/office/drawing/2016/SVG/main" xmlns="" r:embed="rId7"/>
-              </a:ext>
-            </a:extLst>
-          </a:blip>
-          <a:stretch>
-            <a:fillRect/>
-          </a:stretch>
-        </p:blipFill>
-        <p:spPr>
-          <a:xfrm>
-            <a:off x="5969877" y="3322563"/>
-            <a:ext cx="469900" cy="469900"/>
-          </a:xfrm>
-          <a:prstGeom prst="rect">
-            <a:avLst/>
-          </a:prstGeom>
-          <a:solidFill>
-            <a:schemeClr val="bg1"/>
-          </a:solidFill>
-        </p:spPr>
-      </p:pic>
-      <p:sp>
-        <p:nvSpPr>
           <p:cNvPr id="27" name="Rectangle 26">
             <a:extLst>
               <a:ext uri="{FF2B5EF4-FFF2-40B4-BE49-F238E27FC236}">
@@ -4083,8 +3943,8 @@
         </p:nvSpPr>
         <p:spPr>
           <a:xfrm>
-            <a:off x="5239334" y="4672008"/>
-            <a:ext cx="1916392" cy="1210757"/>
+            <a:off x="5181600" y="4614741"/>
+            <a:ext cx="1828800" cy="1210757"/>
           </a:xfrm>
           <a:prstGeom prst="rect">
             <a:avLst/>
@@ -4174,7 +4034,7 @@
         </p:blipFill>
         <p:spPr bwMode="auto">
           <a:xfrm>
-            <a:off x="5398082" y="4974423"/>
+            <a:off x="5296552" y="4917156"/>
             <a:ext cx="1598895" cy="908342"/>
           </a:xfrm>
           <a:prstGeom prst="rect">
@@ -4221,7 +4081,7 @@
         </p:blipFill>
         <p:spPr bwMode="auto">
           <a:xfrm>
-            <a:off x="3224251" y="1284608"/>
+            <a:off x="1905952" y="1284608"/>
             <a:ext cx="762000" cy="762000"/>
           </a:xfrm>
           <a:prstGeom prst="rect">
@@ -4268,7 +4128,7 @@
         </p:nvSpPr>
         <p:spPr bwMode="auto">
           <a:xfrm>
-            <a:off x="2858548" y="2096902"/>
+            <a:off x="1540249" y="2096902"/>
             <a:ext cx="1529147" cy="461665"/>
           </a:xfrm>
           <a:prstGeom prst="rect">
@@ -4442,7 +4302,7 @@
         </p:nvSpPr>
         <p:spPr>
           <a:xfrm>
-            <a:off x="5010529" y="2093554"/>
+            <a:off x="3494094" y="2093554"/>
             <a:ext cx="2301904" cy="276999"/>
           </a:xfrm>
           <a:prstGeom prst="rect">
@@ -4487,7 +4347,7 @@
           <a:blip r:embed="rId2">
             <a:extLst>
               <a:ext uri="{96DAC541-7B7A-43D3-8B79-37D633B846F1}">
-                <asvg:svgBlip xmlns:asvg="http://schemas.microsoft.com/office/drawing/2016/SVG/main" xmlns="" r:embed="rId3"/>
+                <asvg:svgBlip xmlns:asvg="http://schemas.microsoft.com/office/drawing/2016/SVG/main" r:embed="rId3"/>
               </a:ext>
             </a:extLst>
           </a:blip>
@@ -4497,7 +4357,7 @@
         </p:blipFill>
         <p:spPr>
           <a:xfrm>
-            <a:off x="5852184" y="1284608"/>
+            <a:off x="4335749" y="1284608"/>
             <a:ext cx="711200" cy="711200"/>
           </a:xfrm>
           <a:prstGeom prst="rect">
@@ -4534,7 +4394,7 @@
         </p:blipFill>
         <p:spPr bwMode="auto">
           <a:xfrm>
-            <a:off x="8949848" y="1310008"/>
+            <a:off x="7230095" y="1310008"/>
             <a:ext cx="762000" cy="762000"/>
           </a:xfrm>
           <a:prstGeom prst="rect">
@@ -4581,7 +4441,7 @@
         </p:nvSpPr>
         <p:spPr bwMode="auto">
           <a:xfrm>
-            <a:off x="8566274" y="2107103"/>
+            <a:off x="6846521" y="2107103"/>
             <a:ext cx="1529147" cy="461665"/>
           </a:xfrm>
           <a:prstGeom prst="rect">
@@ -4755,7 +4615,7 @@
         </p:nvSpPr>
         <p:spPr>
           <a:xfrm>
-            <a:off x="1961859" y="320919"/>
+            <a:off x="643560" y="320919"/>
             <a:ext cx="2301904" cy="276999"/>
           </a:xfrm>
           <a:prstGeom prst="rect">
@@ -4771,7 +4631,7 @@
           <a:p>
             <a:pPr algn="ctr" defTabSz="914400"/>
             <a:r>
-              <a:rPr lang="en-US" sz="1200" dirty="0" smtClean="0">
+              <a:rPr lang="en-US" sz="1200" dirty="0">
                 <a:solidFill>
                   <a:srgbClr val="232F3D"/>
                 </a:solidFill>
@@ -4779,12 +4639,6 @@
               </a:rPr>
               <a:t>Full integration option</a:t>
             </a:r>
-            <a:endParaRPr lang="en-US" sz="1200" dirty="0">
-              <a:solidFill>
-                <a:srgbClr val="232F3D"/>
-              </a:solidFill>
-              <a:latin typeface="Arial" panose="020B0604020202020204"/>
-            </a:endParaRPr>
           </a:p>
         </p:txBody>
       </p:sp>
@@ -4802,7 +4656,7 @@
         </p:nvSpPr>
         <p:spPr>
           <a:xfrm>
-            <a:off x="5010528" y="307901"/>
+            <a:off x="3494093" y="307901"/>
             <a:ext cx="2409561" cy="276999"/>
           </a:xfrm>
           <a:prstGeom prst="rect">
@@ -4818,7 +4672,7 @@
           <a:p>
             <a:pPr algn="ctr" defTabSz="914400"/>
             <a:r>
-              <a:rPr lang="en-US" sz="1200" dirty="0" smtClean="0">
+              <a:rPr lang="en-US" sz="1200" dirty="0">
                 <a:solidFill>
                   <a:srgbClr val="232F3D"/>
                 </a:solidFill>
@@ -4826,12 +4680,6 @@
               </a:rPr>
               <a:t>AWS Lambda integration option</a:t>
             </a:r>
-            <a:endParaRPr lang="en-US" sz="1200" dirty="0">
-              <a:solidFill>
-                <a:srgbClr val="232F3D"/>
-              </a:solidFill>
-              <a:latin typeface="Arial" panose="020B0604020202020204"/>
-            </a:endParaRPr>
           </a:p>
         </p:txBody>
       </p:sp>
@@ -4849,7 +4697,7 @@
         </p:nvSpPr>
         <p:spPr>
           <a:xfrm>
-            <a:off x="8140193" y="320919"/>
+            <a:off x="6420440" y="320919"/>
             <a:ext cx="2399108" cy="276999"/>
           </a:xfrm>
           <a:prstGeom prst="rect">
@@ -4865,7 +4713,7 @@
           <a:p>
             <a:pPr algn="ctr" defTabSz="914400"/>
             <a:r>
-              <a:rPr lang="en-US" sz="1200" dirty="0" smtClean="0">
+              <a:rPr lang="en-US" sz="1200" dirty="0">
                 <a:solidFill>
                   <a:srgbClr val="232F3D"/>
                 </a:solidFill>
@@ -4873,15 +4721,968 @@
               </a:rPr>
               <a:t>Amazon ECR integration option</a:t>
             </a:r>
-            <a:endParaRPr lang="en-US" sz="1200" dirty="0">
+          </a:p>
+        </p:txBody>
+      </p:sp>
+      <p:sp>
+        <p:nvSpPr>
+          <p:cNvPr id="39" name="Rectangle 38">
+            <a:extLst>
+              <a:ext uri="{FF2B5EF4-FFF2-40B4-BE49-F238E27FC236}">
+                <a16:creationId xmlns:a16="http://schemas.microsoft.com/office/drawing/2014/main" id="{A8BA7165-26C0-0740-BBE6-1EC9996DE980}"/>
+              </a:ext>
+            </a:extLst>
+          </p:cNvPr>
+          <p:cNvSpPr/>
+          <p:nvPr/>
+        </p:nvSpPr>
+        <p:spPr>
+          <a:xfrm>
+            <a:off x="9241950" y="649591"/>
+            <a:ext cx="2496312" cy="2168975"/>
+          </a:xfrm>
+          <a:prstGeom prst="rect">
+            <a:avLst/>
+          </a:prstGeom>
+          <a:noFill/>
+          <a:ln w="12700" cap="flat" cmpd="sng" algn="ctr">
+            <a:solidFill>
+              <a:srgbClr val="232F3D"/>
+            </a:solidFill>
+            <a:prstDash val="solid"/>
+            <a:miter lim="800000"/>
+          </a:ln>
+          <a:effectLst/>
+        </p:spPr>
+        <p:txBody>
+          <a:bodyPr rot="0" spcFirstLastPara="0" vertOverflow="overflow" horzOverflow="overflow" vert="horz" wrap="square" lIns="457200" tIns="91440" rIns="91440" bIns="45720" numCol="1" spcCol="0" rtlCol="0" fromWordArt="0" anchor="t" anchorCtr="0" forceAA="0" compatLnSpc="1">
+            <a:prstTxWarp prst="textNoShape">
+              <a:avLst/>
+            </a:prstTxWarp>
+            <a:noAutofit/>
+          </a:bodyPr>
+          <a:lstStyle/>
+          <a:p>
+            <a:pPr marL="0" marR="0" lvl="0" indent="0" defTabSz="914400" eaLnBrk="1" fontAlgn="auto" latinLnBrk="0" hangingPunct="1">
+              <a:lnSpc>
+                <a:spcPct val="100000"/>
+              </a:lnSpc>
+              <a:spcBef>
+                <a:spcPts val="0"/>
+              </a:spcBef>
+              <a:spcAft>
+                <a:spcPts val="0"/>
+              </a:spcAft>
+              <a:buClrTx/>
+              <a:buSzTx/>
+              <a:buFontTx/>
+              <a:buNone/>
+              <a:tabLst/>
+              <a:defRPr/>
+            </a:pPr>
+            <a:r>
+              <a:rPr kumimoji="0" lang="en-US" sz="1200" b="0" i="0" u="none" strike="noStrike" kern="0" cap="none" spc="0" normalizeH="0" baseline="0" noProof="0" dirty="0">
+                <a:ln>
+                  <a:noFill/>
+                </a:ln>
+                <a:solidFill>
+                  <a:sysClr val="windowText" lastClr="000000"/>
+                </a:solidFill>
+                <a:effectLst/>
+                <a:uLnTx/>
+                <a:uFillTx/>
+                <a:latin typeface="Arial" panose="020B0604020202020204"/>
+                <a:ea typeface="+mn-ea"/>
+                <a:cs typeface="+mn-cs"/>
+              </a:rPr>
+              <a:t>AWS Cloud</a:t>
+            </a:r>
+          </a:p>
+        </p:txBody>
+      </p:sp>
+      <p:pic>
+        <p:nvPicPr>
+          <p:cNvPr id="40" name="Graphic 37">
+            <a:extLst>
+              <a:ext uri="{FF2B5EF4-FFF2-40B4-BE49-F238E27FC236}">
+                <a16:creationId xmlns:a16="http://schemas.microsoft.com/office/drawing/2014/main" id="{023F9397-7F82-BF46-B87B-575D02DBE141}"/>
+              </a:ext>
+            </a:extLst>
+          </p:cNvPr>
+          <p:cNvPicPr>
+            <a:picLocks noChangeAspect="1"/>
+          </p:cNvPicPr>
+          <p:nvPr/>
+        </p:nvPicPr>
+        <p:blipFill>
+          <a:blip r:embed="rId4">
+            <a:extLst>
+              <a:ext uri="{96DAC541-7B7A-43D3-8B79-37D633B846F1}">
+                <asvg:svgBlip xmlns:asvg="http://schemas.microsoft.com/office/drawing/2016/SVG/main" r:embed="rId5"/>
+              </a:ext>
+            </a:extLst>
+          </a:blip>
+          <a:stretch>
+            <a:fillRect/>
+          </a:stretch>
+        </p:blipFill>
+        <p:spPr>
+          <a:xfrm>
+            <a:off x="9241950" y="660594"/>
+            <a:ext cx="330200" cy="330200"/>
+          </a:xfrm>
+          <a:prstGeom prst="rect">
+            <a:avLst/>
+          </a:prstGeom>
+        </p:spPr>
+      </p:pic>
+      <p:sp>
+        <p:nvSpPr>
+          <p:cNvPr id="41" name="Rectangle 40">
+            <a:extLst>
+              <a:ext uri="{FF2B5EF4-FFF2-40B4-BE49-F238E27FC236}">
+                <a16:creationId xmlns:a16="http://schemas.microsoft.com/office/drawing/2014/main" id="{59ACECF5-2B42-554D-849A-D854506F19A7}"/>
+              </a:ext>
+            </a:extLst>
+          </p:cNvPr>
+          <p:cNvSpPr/>
+          <p:nvPr/>
+        </p:nvSpPr>
+        <p:spPr>
+          <a:xfrm>
+            <a:off x="10432260" y="3309973"/>
+            <a:ext cx="629827" cy="1026884"/>
+          </a:xfrm>
+          <a:prstGeom prst="rect">
+            <a:avLst/>
+          </a:prstGeom>
+          <a:solidFill>
+            <a:schemeClr val="bg1"/>
+          </a:solidFill>
+          <a:ln>
+            <a:noFill/>
+          </a:ln>
+        </p:spPr>
+        <p:style>
+          <a:lnRef idx="2">
+            <a:schemeClr val="accent1">
+              <a:shade val="50000"/>
+            </a:schemeClr>
+          </a:lnRef>
+          <a:fillRef idx="1">
+            <a:schemeClr val="accent1"/>
+          </a:fillRef>
+          <a:effectRef idx="0">
+            <a:schemeClr val="accent1"/>
+          </a:effectRef>
+          <a:fontRef idx="minor">
+            <a:schemeClr val="lt1"/>
+          </a:fontRef>
+        </p:style>
+        <p:txBody>
+          <a:bodyPr rtlCol="0" anchor="ctr"/>
+          <a:lstStyle/>
+          <a:p>
+            <a:pPr algn="ctr"/>
+            <a:endParaRPr lang="en-US"/>
+          </a:p>
+        </p:txBody>
+      </p:sp>
+      <p:pic>
+        <p:nvPicPr>
+          <p:cNvPr id="44" name="Graphic 20">
+            <a:extLst>
+              <a:ext uri="{FF2B5EF4-FFF2-40B4-BE49-F238E27FC236}">
+                <a16:creationId xmlns:a16="http://schemas.microsoft.com/office/drawing/2014/main" id="{30591584-0A09-0B4C-925B-AA6FD8ADC550}"/>
+              </a:ext>
+            </a:extLst>
+          </p:cNvPr>
+          <p:cNvPicPr>
+            <a:picLocks noChangeAspect="1" noChangeArrowheads="1"/>
+          </p:cNvPicPr>
+          <p:nvPr/>
+        </p:nvPicPr>
+        <p:blipFill>
+          <a:blip r:embed="rId9" cstate="print">
+            <a:extLst>
+              <a:ext uri="{28A0092B-C50C-407E-A947-70E740481C1C}">
+                <a14:useLocalDpi xmlns:a14="http://schemas.microsoft.com/office/drawing/2010/main" val="0"/>
+              </a:ext>
+            </a:extLst>
+          </a:blip>
+          <a:srcRect/>
+          <a:stretch>
+            <a:fillRect/>
+          </a:stretch>
+        </p:blipFill>
+        <p:spPr bwMode="auto">
+          <a:xfrm>
+            <a:off x="10148809" y="1318662"/>
+            <a:ext cx="762000" cy="762000"/>
+          </a:xfrm>
+          <a:prstGeom prst="rect">
+            <a:avLst/>
+          </a:prstGeom>
+          <a:noFill/>
+          <a:ln>
+            <a:noFill/>
+          </a:ln>
+          <a:extLst>
+            <a:ext uri="{909E8E84-426E-40DD-AFC4-6F175D3DCCD1}">
+              <a14:hiddenFill xmlns:a14="http://schemas.microsoft.com/office/drawing/2010/main">
+                <a:solidFill>
+                  <a:srgbClr val="FFFFFF"/>
+                </a:solidFill>
+              </a14:hiddenFill>
+            </a:ext>
+            <a:ext uri="{91240B29-F687-4F45-9708-019B960494DF}">
+              <a14:hiddenLine xmlns:a14="http://schemas.microsoft.com/office/drawing/2010/main" w="9525">
+                <a:solidFill>
+                  <a:srgbClr val="000000"/>
+                </a:solidFill>
+                <a:miter lim="800000"/>
+                <a:headEnd/>
+                <a:tailEnd/>
+              </a14:hiddenLine>
+            </a:ext>
+          </a:extLst>
+        </p:spPr>
+      </p:pic>
+      <p:sp>
+        <p:nvSpPr>
+          <p:cNvPr id="45" name="TextBox 22">
+            <a:extLst>
+              <a:ext uri="{FF2B5EF4-FFF2-40B4-BE49-F238E27FC236}">
+                <a16:creationId xmlns:a16="http://schemas.microsoft.com/office/drawing/2014/main" id="{8358C4C0-532B-A14C-9972-FFC141345AD6}"/>
+              </a:ext>
+            </a:extLst>
+          </p:cNvPr>
+          <p:cNvSpPr txBox="1">
+            <a:spLocks noChangeArrowheads="1"/>
+          </p:cNvSpPr>
+          <p:nvPr/>
+        </p:nvSpPr>
+        <p:spPr bwMode="auto">
+          <a:xfrm>
+            <a:off x="9765235" y="2115757"/>
+            <a:ext cx="1529147" cy="461665"/>
+          </a:xfrm>
+          <a:prstGeom prst="rect">
+            <a:avLst/>
+          </a:prstGeom>
+          <a:noFill/>
+          <a:ln>
+            <a:noFill/>
+          </a:ln>
+          <a:extLst>
+            <a:ext uri="{909E8E84-426E-40DD-AFC4-6F175D3DCCD1}">
+              <a14:hiddenFill xmlns:a14="http://schemas.microsoft.com/office/drawing/2010/main">
+                <a:solidFill>
+                  <a:srgbClr val="FFFFFF"/>
+                </a:solidFill>
+              </a14:hiddenFill>
+            </a:ext>
+            <a:ext uri="{91240B29-F687-4F45-9708-019B960494DF}">
+              <a14:hiddenLine xmlns:a14="http://schemas.microsoft.com/office/drawing/2010/main" w="9525">
+                <a:solidFill>
+                  <a:srgbClr val="000000"/>
+                </a:solidFill>
+                <a:miter lim="800000"/>
+                <a:headEnd/>
+                <a:tailEnd/>
+              </a14:hiddenLine>
+            </a:ext>
+          </a:extLst>
+        </p:spPr>
+        <p:txBody>
+          <a:bodyPr wrap="square">
+            <a:spAutoFit/>
+          </a:bodyPr>
+          <a:lstStyle>
+            <a:lvl1pPr>
+              <a:defRPr>
+                <a:solidFill>
+                  <a:schemeClr val="tx1"/>
+                </a:solidFill>
+                <a:latin typeface="Calibri" panose="020F0502020204030204" pitchFamily="34" charset="0"/>
+              </a:defRPr>
+            </a:lvl1pPr>
+            <a:lvl2pPr marL="742950" indent="-285750">
+              <a:defRPr>
+                <a:solidFill>
+                  <a:schemeClr val="tx1"/>
+                </a:solidFill>
+                <a:latin typeface="Calibri" panose="020F0502020204030204" pitchFamily="34" charset="0"/>
+              </a:defRPr>
+            </a:lvl2pPr>
+            <a:lvl3pPr marL="1143000" indent="-228600">
+              <a:defRPr>
+                <a:solidFill>
+                  <a:schemeClr val="tx1"/>
+                </a:solidFill>
+                <a:latin typeface="Calibri" panose="020F0502020204030204" pitchFamily="34" charset="0"/>
+              </a:defRPr>
+            </a:lvl3pPr>
+            <a:lvl4pPr marL="1600200" indent="-228600">
+              <a:defRPr>
+                <a:solidFill>
+                  <a:schemeClr val="tx1"/>
+                </a:solidFill>
+                <a:latin typeface="Calibri" panose="020F0502020204030204" pitchFamily="34" charset="0"/>
+              </a:defRPr>
+            </a:lvl4pPr>
+            <a:lvl5pPr marL="2057400" indent="-228600">
+              <a:defRPr>
+                <a:solidFill>
+                  <a:schemeClr val="tx1"/>
+                </a:solidFill>
+                <a:latin typeface="Calibri" panose="020F0502020204030204" pitchFamily="34" charset="0"/>
+              </a:defRPr>
+            </a:lvl5pPr>
+            <a:lvl6pPr marL="2514600" indent="-228600" eaLnBrk="0" fontAlgn="base" hangingPunct="0">
+              <a:spcBef>
+                <a:spcPct val="0"/>
+              </a:spcBef>
+              <a:spcAft>
+                <a:spcPct val="0"/>
+              </a:spcAft>
+              <a:defRPr>
+                <a:solidFill>
+                  <a:schemeClr val="tx1"/>
+                </a:solidFill>
+                <a:latin typeface="Calibri" panose="020F0502020204030204" pitchFamily="34" charset="0"/>
+              </a:defRPr>
+            </a:lvl6pPr>
+            <a:lvl7pPr marL="2971800" indent="-228600" eaLnBrk="0" fontAlgn="base" hangingPunct="0">
+              <a:spcBef>
+                <a:spcPct val="0"/>
+              </a:spcBef>
+              <a:spcAft>
+                <a:spcPct val="0"/>
+              </a:spcAft>
+              <a:defRPr>
+                <a:solidFill>
+                  <a:schemeClr val="tx1"/>
+                </a:solidFill>
+                <a:latin typeface="Calibri" panose="020F0502020204030204" pitchFamily="34" charset="0"/>
+              </a:defRPr>
+            </a:lvl7pPr>
+            <a:lvl8pPr marL="3429000" indent="-228600" eaLnBrk="0" fontAlgn="base" hangingPunct="0">
+              <a:spcBef>
+                <a:spcPct val="0"/>
+              </a:spcBef>
+              <a:spcAft>
+                <a:spcPct val="0"/>
+              </a:spcAft>
+              <a:defRPr>
+                <a:solidFill>
+                  <a:schemeClr val="tx1"/>
+                </a:solidFill>
+                <a:latin typeface="Calibri" panose="020F0502020204030204" pitchFamily="34" charset="0"/>
+              </a:defRPr>
+            </a:lvl8pPr>
+            <a:lvl9pPr marL="3886200" indent="-228600" eaLnBrk="0" fontAlgn="base" hangingPunct="0">
+              <a:spcBef>
+                <a:spcPct val="0"/>
+              </a:spcBef>
+              <a:spcAft>
+                <a:spcPct val="0"/>
+              </a:spcAft>
+              <a:defRPr>
+                <a:solidFill>
+                  <a:schemeClr val="tx1"/>
+                </a:solidFill>
+                <a:latin typeface="Calibri" panose="020F0502020204030204" pitchFamily="34" charset="0"/>
+              </a:defRPr>
+            </a:lvl9pPr>
+          </a:lstStyle>
+          <a:p>
+            <a:pPr algn="ctr" eaLnBrk="1" hangingPunct="1"/>
+            <a:r>
+              <a:rPr lang="en-US" altLang="en-US" sz="1200" dirty="0">
+                <a:latin typeface="Arial" panose="020B0604020202020204" pitchFamily="34" charset="0"/>
+                <a:ea typeface="Amazon Ember" panose="020B0603020204020204" pitchFamily="34" charset="0"/>
+                <a:cs typeface="Arial" panose="020B0604020202020204" pitchFamily="34" charset="0"/>
+              </a:rPr>
+              <a:t>Amazon Elastic</a:t>
+            </a:r>
+            <a:br>
+              <a:rPr lang="en-US" altLang="en-US" sz="1200" dirty="0">
+                <a:latin typeface="Arial" panose="020B0604020202020204" pitchFamily="34" charset="0"/>
+                <a:ea typeface="Amazon Ember" panose="020B0603020204020204" pitchFamily="34" charset="0"/>
+                <a:cs typeface="Arial" panose="020B0604020202020204" pitchFamily="34" charset="0"/>
+              </a:rPr>
+            </a:br>
+            <a:r>
+              <a:rPr lang="en-US" altLang="en-US" sz="1200" dirty="0">
+                <a:latin typeface="Arial" panose="020B0604020202020204" pitchFamily="34" charset="0"/>
+                <a:ea typeface="Amazon Ember" panose="020B0603020204020204" pitchFamily="34" charset="0"/>
+                <a:cs typeface="Arial" panose="020B0604020202020204" pitchFamily="34" charset="0"/>
+              </a:rPr>
+              <a:t>Container Registry</a:t>
+            </a:r>
+          </a:p>
+        </p:txBody>
+      </p:sp>
+      <p:sp>
+        <p:nvSpPr>
+          <p:cNvPr id="46" name="TextBox 45">
+            <a:extLst>
+              <a:ext uri="{FF2B5EF4-FFF2-40B4-BE49-F238E27FC236}">
+                <a16:creationId xmlns:a16="http://schemas.microsoft.com/office/drawing/2014/main" id="{C0D7F050-1CF0-8940-A398-3A778727E729}"/>
+              </a:ext>
+            </a:extLst>
+          </p:cNvPr>
+          <p:cNvSpPr txBox="1"/>
+          <p:nvPr/>
+        </p:nvSpPr>
+        <p:spPr>
+          <a:xfrm>
+            <a:off x="9241892" y="176225"/>
+            <a:ext cx="2496312" cy="461665"/>
+          </a:xfrm>
+          <a:prstGeom prst="rect">
+            <a:avLst/>
+          </a:prstGeom>
+          <a:noFill/>
+        </p:spPr>
+        <p:txBody>
+          <a:bodyPr wrap="square" rtlCol="0">
+            <a:spAutoFit/>
+          </a:bodyPr>
+          <a:lstStyle/>
+          <a:p>
+            <a:pPr algn="ctr" defTabSz="914400"/>
+            <a:r>
+              <a:rPr lang="en-US" sz="1200" dirty="0">
+                <a:solidFill>
+                  <a:srgbClr val="232F3D"/>
+                </a:solidFill>
+                <a:latin typeface="Arial" panose="020B0604020202020204"/>
+              </a:rPr>
+              <a:t>Amazon ECR integration option 2 (automated </a:t>
+            </a:r>
+            <a:r>
+              <a:rPr lang="en-US" sz="1200" dirty="0" err="1">
+                <a:solidFill>
+                  <a:srgbClr val="232F3D"/>
+                </a:solidFill>
+                <a:latin typeface="Arial" panose="020B0604020202020204"/>
+              </a:rPr>
+              <a:t>Snyk</a:t>
+            </a:r>
+            <a:r>
+              <a:rPr lang="en-US" sz="1200" dirty="0">
+                <a:solidFill>
+                  <a:srgbClr val="232F3D"/>
+                </a:solidFill>
+                <a:latin typeface="Arial" panose="020B0604020202020204"/>
+              </a:rPr>
+              <a:t> connection)</a:t>
+            </a:r>
+          </a:p>
+        </p:txBody>
+      </p:sp>
+      <p:sp>
+        <p:nvSpPr>
+          <p:cNvPr id="47" name="Freeform 46">
+            <a:extLst>
+              <a:ext uri="{FF2B5EF4-FFF2-40B4-BE49-F238E27FC236}">
+                <a16:creationId xmlns:a16="http://schemas.microsoft.com/office/drawing/2014/main" id="{4E0B1717-4694-0042-A5FD-B38DA60FFF63}"/>
+              </a:ext>
+            </a:extLst>
+          </p:cNvPr>
+          <p:cNvSpPr/>
+          <p:nvPr/>
+        </p:nvSpPr>
+        <p:spPr>
+          <a:xfrm flipV="1">
+            <a:off x="7054196" y="2818247"/>
+            <a:ext cx="3405760" cy="2563503"/>
+          </a:xfrm>
+          <a:custGeom>
+            <a:avLst/>
+            <a:gdLst>
+              <a:gd name="connsiteX0" fmla="*/ 1371600 w 1371600"/>
+              <a:gd name="connsiteY0" fmla="*/ 711200 h 711200"/>
+              <a:gd name="connsiteX1" fmla="*/ 1371600 w 1371600"/>
+              <a:gd name="connsiteY1" fmla="*/ 0 h 711200"/>
+              <a:gd name="connsiteX2" fmla="*/ 0 w 1371600"/>
+              <a:gd name="connsiteY2" fmla="*/ 0 h 711200"/>
+            </a:gdLst>
+            <a:ahLst/>
+            <a:cxnLst>
+              <a:cxn ang="0">
+                <a:pos x="connsiteX0" y="connsiteY0"/>
+              </a:cxn>
+              <a:cxn ang="0">
+                <a:pos x="connsiteX1" y="connsiteY1"/>
+              </a:cxn>
+              <a:cxn ang="0">
+                <a:pos x="connsiteX2" y="connsiteY2"/>
+              </a:cxn>
+            </a:cxnLst>
+            <a:rect l="l" t="t" r="r" b="b"/>
+            <a:pathLst>
+              <a:path w="1371600" h="711200">
+                <a:moveTo>
+                  <a:pt x="1371600" y="711200"/>
+                </a:moveTo>
+                <a:lnTo>
+                  <a:pt x="1371600" y="0"/>
+                </a:lnTo>
+                <a:lnTo>
+                  <a:pt x="0" y="0"/>
+                </a:lnTo>
+              </a:path>
+            </a:pathLst>
+          </a:custGeom>
+          <a:noFill/>
+          <a:ln w="12700" cap="flat" cmpd="sng" algn="ctr">
+            <a:solidFill>
+              <a:srgbClr val="535B63"/>
+            </a:solidFill>
+            <a:prstDash val="solid"/>
+            <a:miter lim="800000"/>
+            <a:headEnd type="arrow" w="med" len="sm"/>
+            <a:tailEnd type="arrow" w="med" len="sm"/>
+          </a:ln>
+          <a:effectLst/>
+        </p:spPr>
+        <p:txBody>
+          <a:bodyPr rtlCol="0" anchor="ctr"/>
+          <a:lstStyle/>
+          <a:p>
+            <a:pPr marL="0" marR="0" lvl="0" indent="0" algn="ctr" defTabSz="914400" eaLnBrk="1" fontAlgn="auto" latinLnBrk="0" hangingPunct="1">
+              <a:lnSpc>
+                <a:spcPct val="100000"/>
+              </a:lnSpc>
+              <a:spcBef>
+                <a:spcPts val="0"/>
+              </a:spcBef>
+              <a:spcAft>
+                <a:spcPts val="0"/>
+              </a:spcAft>
+              <a:buClrTx/>
+              <a:buSzTx/>
+              <a:buFontTx/>
+              <a:buNone/>
+              <a:tabLst/>
+              <a:defRPr/>
+            </a:pPr>
+            <a:endParaRPr kumimoji="0" lang="en-US" sz="1800" b="0" i="0" u="none" strike="noStrike" kern="0" cap="none" spc="0" normalizeH="0" baseline="0" noProof="0" dirty="0">
+              <a:ln>
+                <a:noFill/>
+              </a:ln>
               <a:solidFill>
-                <a:srgbClr val="232F3D"/>
+                <a:srgbClr val="FAFAFA"/>
               </a:solidFill>
+              <a:effectLst/>
+              <a:uLnTx/>
+              <a:uFillTx/>
               <a:latin typeface="Arial" panose="020B0604020202020204"/>
+              <a:ea typeface="+mn-ea"/>
+              <a:cs typeface="+mn-cs"/>
             </a:endParaRPr>
           </a:p>
         </p:txBody>
       </p:sp>
+      <p:sp>
+        <p:nvSpPr>
+          <p:cNvPr id="50" name="Freeform 49">
+            <a:extLst>
+              <a:ext uri="{FF2B5EF4-FFF2-40B4-BE49-F238E27FC236}">
+                <a16:creationId xmlns:a16="http://schemas.microsoft.com/office/drawing/2014/main" id="{762817DA-9091-9B4A-9C5F-19ECCFD82C0D}"/>
+              </a:ext>
+            </a:extLst>
+          </p:cNvPr>
+          <p:cNvSpPr/>
+          <p:nvPr/>
+        </p:nvSpPr>
+        <p:spPr>
+          <a:xfrm flipH="1" flipV="1">
+            <a:off x="4688389" y="2809596"/>
+            <a:ext cx="445364" cy="2107559"/>
+          </a:xfrm>
+          <a:custGeom>
+            <a:avLst/>
+            <a:gdLst>
+              <a:gd name="connsiteX0" fmla="*/ 1371600 w 1371600"/>
+              <a:gd name="connsiteY0" fmla="*/ 711200 h 711200"/>
+              <a:gd name="connsiteX1" fmla="*/ 1371600 w 1371600"/>
+              <a:gd name="connsiteY1" fmla="*/ 0 h 711200"/>
+              <a:gd name="connsiteX2" fmla="*/ 0 w 1371600"/>
+              <a:gd name="connsiteY2" fmla="*/ 0 h 711200"/>
+            </a:gdLst>
+            <a:ahLst/>
+            <a:cxnLst>
+              <a:cxn ang="0">
+                <a:pos x="connsiteX0" y="connsiteY0"/>
+              </a:cxn>
+              <a:cxn ang="0">
+                <a:pos x="connsiteX1" y="connsiteY1"/>
+              </a:cxn>
+              <a:cxn ang="0">
+                <a:pos x="connsiteX2" y="connsiteY2"/>
+              </a:cxn>
+            </a:cxnLst>
+            <a:rect l="l" t="t" r="r" b="b"/>
+            <a:pathLst>
+              <a:path w="1371600" h="711200">
+                <a:moveTo>
+                  <a:pt x="1371600" y="711200"/>
+                </a:moveTo>
+                <a:lnTo>
+                  <a:pt x="1371600" y="0"/>
+                </a:lnTo>
+                <a:lnTo>
+                  <a:pt x="0" y="0"/>
+                </a:lnTo>
+              </a:path>
+            </a:pathLst>
+          </a:custGeom>
+          <a:noFill/>
+          <a:ln w="12700" cap="flat" cmpd="sng" algn="ctr">
+            <a:solidFill>
+              <a:srgbClr val="535B63"/>
+            </a:solidFill>
+            <a:prstDash val="solid"/>
+            <a:miter lim="800000"/>
+            <a:headEnd type="arrow" w="med" len="sm"/>
+            <a:tailEnd type="arrow" w="med" len="sm"/>
+          </a:ln>
+          <a:effectLst/>
+        </p:spPr>
+        <p:txBody>
+          <a:bodyPr rtlCol="0" anchor="ctr"/>
+          <a:lstStyle/>
+          <a:p>
+            <a:pPr marL="0" marR="0" lvl="0" indent="0" algn="ctr" defTabSz="914400" eaLnBrk="1" fontAlgn="auto" latinLnBrk="0" hangingPunct="1">
+              <a:lnSpc>
+                <a:spcPct val="100000"/>
+              </a:lnSpc>
+              <a:spcBef>
+                <a:spcPts val="0"/>
+              </a:spcBef>
+              <a:spcAft>
+                <a:spcPts val="0"/>
+              </a:spcAft>
+              <a:buClrTx/>
+              <a:buSzTx/>
+              <a:buFontTx/>
+              <a:buNone/>
+              <a:tabLst/>
+              <a:defRPr/>
+            </a:pPr>
+            <a:endParaRPr kumimoji="0" lang="en-US" sz="1800" b="0" i="0" u="none" strike="noStrike" kern="0" cap="none" spc="0" normalizeH="0" baseline="0" noProof="0" dirty="0">
+              <a:ln>
+                <a:noFill/>
+              </a:ln>
+              <a:solidFill>
+                <a:srgbClr val="FAFAFA"/>
+              </a:solidFill>
+              <a:effectLst/>
+              <a:uLnTx/>
+              <a:uFillTx/>
+              <a:latin typeface="Arial" panose="020B0604020202020204"/>
+              <a:ea typeface="+mn-ea"/>
+              <a:cs typeface="+mn-cs"/>
+            </a:endParaRPr>
+          </a:p>
+        </p:txBody>
+      </p:sp>
+      <p:sp>
+        <p:nvSpPr>
+          <p:cNvPr id="51" name="Rectangle 50">
+            <a:extLst>
+              <a:ext uri="{FF2B5EF4-FFF2-40B4-BE49-F238E27FC236}">
+                <a16:creationId xmlns:a16="http://schemas.microsoft.com/office/drawing/2014/main" id="{73B90082-4F84-FC4E-B9D3-BC1F329FCDFB}"/>
+              </a:ext>
+            </a:extLst>
+          </p:cNvPr>
+          <p:cNvSpPr/>
+          <p:nvPr/>
+        </p:nvSpPr>
+        <p:spPr>
+          <a:xfrm>
+            <a:off x="10432259" y="3259270"/>
+            <a:ext cx="629827" cy="1026884"/>
+          </a:xfrm>
+          <a:prstGeom prst="rect">
+            <a:avLst/>
+          </a:prstGeom>
+          <a:solidFill>
+            <a:schemeClr val="bg1"/>
+          </a:solidFill>
+          <a:ln>
+            <a:noFill/>
+          </a:ln>
+        </p:spPr>
+        <p:style>
+          <a:lnRef idx="2">
+            <a:schemeClr val="accent1">
+              <a:shade val="50000"/>
+            </a:schemeClr>
+          </a:lnRef>
+          <a:fillRef idx="1">
+            <a:schemeClr val="accent1"/>
+          </a:fillRef>
+          <a:effectRef idx="0">
+            <a:schemeClr val="accent1"/>
+          </a:effectRef>
+          <a:fontRef idx="minor">
+            <a:schemeClr val="lt1"/>
+          </a:fontRef>
+        </p:style>
+        <p:txBody>
+          <a:bodyPr rtlCol="0" anchor="ctr"/>
+          <a:lstStyle/>
+          <a:p>
+            <a:pPr algn="ctr"/>
+            <a:endParaRPr lang="en-US"/>
+          </a:p>
+        </p:txBody>
+      </p:sp>
+      <p:sp>
+        <p:nvSpPr>
+          <p:cNvPr id="52" name="TextBox 51">
+            <a:extLst>
+              <a:ext uri="{FF2B5EF4-FFF2-40B4-BE49-F238E27FC236}">
+                <a16:creationId xmlns:a16="http://schemas.microsoft.com/office/drawing/2014/main" id="{642A07FB-1732-1644-9D70-0059D2833D18}"/>
+              </a:ext>
+            </a:extLst>
+          </p:cNvPr>
+          <p:cNvSpPr txBox="1"/>
+          <p:nvPr/>
+        </p:nvSpPr>
+        <p:spPr>
+          <a:xfrm>
+            <a:off x="9566836" y="3687729"/>
+            <a:ext cx="1730846" cy="523220"/>
+          </a:xfrm>
+          <a:prstGeom prst="rect">
+            <a:avLst/>
+          </a:prstGeom>
+          <a:noFill/>
+        </p:spPr>
+        <p:txBody>
+          <a:bodyPr wrap="square" rtlCol="0">
+            <a:spAutoFit/>
+          </a:bodyPr>
+          <a:lstStyle/>
+          <a:p>
+            <a:pPr algn="ctr" defTabSz="914400"/>
+            <a:r>
+              <a:rPr lang="en-US" sz="1400" dirty="0">
+                <a:solidFill>
+                  <a:srgbClr val="232F3D"/>
+                </a:solidFill>
+                <a:latin typeface="Arial" panose="020B0604020202020204"/>
+              </a:rPr>
+              <a:t>Cross-account </a:t>
+            </a:r>
+            <a:br>
+              <a:rPr lang="en-US" sz="1400" dirty="0">
+                <a:solidFill>
+                  <a:srgbClr val="232F3D"/>
+                </a:solidFill>
+                <a:latin typeface="Arial" panose="020B0604020202020204"/>
+              </a:rPr>
+            </a:br>
+            <a:r>
+              <a:rPr lang="en-US" sz="1400" dirty="0">
+                <a:solidFill>
+                  <a:srgbClr val="232F3D"/>
+                </a:solidFill>
+                <a:latin typeface="Arial" panose="020B0604020202020204"/>
+              </a:rPr>
+              <a:t>IAM role</a:t>
+            </a:r>
+          </a:p>
+        </p:txBody>
+      </p:sp>
+      <p:pic>
+        <p:nvPicPr>
+          <p:cNvPr id="53" name="Graphic 82">
+            <a:extLst>
+              <a:ext uri="{FF2B5EF4-FFF2-40B4-BE49-F238E27FC236}">
+                <a16:creationId xmlns:a16="http://schemas.microsoft.com/office/drawing/2014/main" id="{922DB901-BC2E-794B-AAD2-9DA146FCC7B7}"/>
+              </a:ext>
+            </a:extLst>
+          </p:cNvPr>
+          <p:cNvPicPr>
+            <a:picLocks noChangeAspect="1"/>
+          </p:cNvPicPr>
+          <p:nvPr/>
+        </p:nvPicPr>
+        <p:blipFill>
+          <a:blip r:embed="rId6">
+            <a:extLst>
+              <a:ext uri="{96DAC541-7B7A-43D3-8B79-37D633B846F1}">
+                <asvg:svgBlip xmlns:asvg="http://schemas.microsoft.com/office/drawing/2016/SVG/main" r:embed="rId7"/>
+              </a:ext>
+            </a:extLst>
+          </a:blip>
+          <a:stretch>
+            <a:fillRect/>
+          </a:stretch>
+        </p:blipFill>
+        <p:spPr>
+          <a:xfrm>
+            <a:off x="10224359" y="3289936"/>
+            <a:ext cx="469900" cy="469900"/>
+          </a:xfrm>
+          <a:prstGeom prst="rect">
+            <a:avLst/>
+          </a:prstGeom>
+        </p:spPr>
+      </p:pic>
+      <p:sp>
+        <p:nvSpPr>
+          <p:cNvPr id="54" name="Rectangle 53">
+            <a:extLst>
+              <a:ext uri="{FF2B5EF4-FFF2-40B4-BE49-F238E27FC236}">
+                <a16:creationId xmlns:a16="http://schemas.microsoft.com/office/drawing/2014/main" id="{DE8263BB-B397-6546-93E8-C61620BDE1C8}"/>
+              </a:ext>
+            </a:extLst>
+          </p:cNvPr>
+          <p:cNvSpPr/>
+          <p:nvPr/>
+        </p:nvSpPr>
+        <p:spPr>
+          <a:xfrm>
+            <a:off x="4657290" y="3229954"/>
+            <a:ext cx="629827" cy="1026884"/>
+          </a:xfrm>
+          <a:prstGeom prst="rect">
+            <a:avLst/>
+          </a:prstGeom>
+          <a:solidFill>
+            <a:schemeClr val="bg1"/>
+          </a:solidFill>
+          <a:ln>
+            <a:noFill/>
+          </a:ln>
+        </p:spPr>
+        <p:style>
+          <a:lnRef idx="2">
+            <a:schemeClr val="accent1">
+              <a:shade val="50000"/>
+            </a:schemeClr>
+          </a:lnRef>
+          <a:fillRef idx="1">
+            <a:schemeClr val="accent1"/>
+          </a:fillRef>
+          <a:effectRef idx="0">
+            <a:schemeClr val="accent1"/>
+          </a:effectRef>
+          <a:fontRef idx="minor">
+            <a:schemeClr val="lt1"/>
+          </a:fontRef>
+        </p:style>
+        <p:txBody>
+          <a:bodyPr rtlCol="0" anchor="ctr"/>
+          <a:lstStyle/>
+          <a:p>
+            <a:pPr algn="ctr"/>
+            <a:endParaRPr lang="en-US"/>
+          </a:p>
+        </p:txBody>
+      </p:sp>
+      <p:sp>
+        <p:nvSpPr>
+          <p:cNvPr id="55" name="TextBox 54">
+            <a:extLst>
+              <a:ext uri="{FF2B5EF4-FFF2-40B4-BE49-F238E27FC236}">
+                <a16:creationId xmlns:a16="http://schemas.microsoft.com/office/drawing/2014/main" id="{E5BDF501-9740-614B-8DA0-9EA52907946D}"/>
+              </a:ext>
+            </a:extLst>
+          </p:cNvPr>
+          <p:cNvSpPr txBox="1"/>
+          <p:nvPr/>
+        </p:nvSpPr>
+        <p:spPr>
+          <a:xfrm>
+            <a:off x="3791867" y="3658413"/>
+            <a:ext cx="1730846" cy="523220"/>
+          </a:xfrm>
+          <a:prstGeom prst="rect">
+            <a:avLst/>
+          </a:prstGeom>
+          <a:noFill/>
+        </p:spPr>
+        <p:txBody>
+          <a:bodyPr wrap="square" rtlCol="0">
+            <a:spAutoFit/>
+          </a:bodyPr>
+          <a:lstStyle/>
+          <a:p>
+            <a:pPr algn="ctr" defTabSz="914400"/>
+            <a:r>
+              <a:rPr lang="en-US" sz="1400" dirty="0">
+                <a:solidFill>
+                  <a:srgbClr val="232F3D"/>
+                </a:solidFill>
+                <a:latin typeface="Arial" panose="020B0604020202020204"/>
+              </a:rPr>
+              <a:t>Cross-account </a:t>
+            </a:r>
+            <a:br>
+              <a:rPr lang="en-US" sz="1400" dirty="0">
+                <a:solidFill>
+                  <a:srgbClr val="232F3D"/>
+                </a:solidFill>
+                <a:latin typeface="Arial" panose="020B0604020202020204"/>
+              </a:rPr>
+            </a:br>
+            <a:r>
+              <a:rPr lang="en-US" sz="1400" dirty="0">
+                <a:solidFill>
+                  <a:srgbClr val="232F3D"/>
+                </a:solidFill>
+                <a:latin typeface="Arial" panose="020B0604020202020204"/>
+              </a:rPr>
+              <a:t>IAM role</a:t>
+            </a:r>
+          </a:p>
+        </p:txBody>
+      </p:sp>
+      <p:pic>
+        <p:nvPicPr>
+          <p:cNvPr id="56" name="Graphic 82">
+            <a:extLst>
+              <a:ext uri="{FF2B5EF4-FFF2-40B4-BE49-F238E27FC236}">
+                <a16:creationId xmlns:a16="http://schemas.microsoft.com/office/drawing/2014/main" id="{1D679939-3BAC-4C4B-85E0-7291A2B671FD}"/>
+              </a:ext>
+            </a:extLst>
+          </p:cNvPr>
+          <p:cNvPicPr>
+            <a:picLocks noChangeAspect="1"/>
+          </p:cNvPicPr>
+          <p:nvPr/>
+        </p:nvPicPr>
+        <p:blipFill>
+          <a:blip r:embed="rId6">
+            <a:extLst>
+              <a:ext uri="{96DAC541-7B7A-43D3-8B79-37D633B846F1}">
+                <asvg:svgBlip xmlns:asvg="http://schemas.microsoft.com/office/drawing/2016/SVG/main" r:embed="rId7"/>
+              </a:ext>
+            </a:extLst>
+          </a:blip>
+          <a:stretch>
+            <a:fillRect/>
+          </a:stretch>
+        </p:blipFill>
+        <p:spPr>
+          <a:xfrm>
+            <a:off x="4449390" y="3260620"/>
+            <a:ext cx="469900" cy="469900"/>
+          </a:xfrm>
+          <a:prstGeom prst="rect">
+            <a:avLst/>
+          </a:prstGeom>
+        </p:spPr>
+      </p:pic>
     </p:spTree>
     <p:extLst>
       <p:ext uri="{BB962C8B-B14F-4D97-AF65-F5344CB8AC3E}">

</xml_diff>